<commit_message>
Robot feedback data is stored to file. Idea is to log system parameters during PID tuning process.
Replace Quaternion message with gyro euler degrees message.
Extended robot feedback message.
</commit_message>
<xml_diff>
--- a/Documents/block_diagram.pptx
+++ b/Documents/block_diagram.pptx
@@ -288,7 +288,7 @@
           <a:p>
             <a:fld id="{2D851175-439F-4176-B87B-D52E5408CB3F}" type="datetimeFigureOut">
               <a:rPr lang="et-EE" smtClean="0"/>
-              <a:t>25.10.2015</a:t>
+              <a:t>27.04.2016</a:t>
             </a:fld>
             <a:endParaRPr lang="et-EE"/>
           </a:p>
@@ -458,7 +458,7 @@
           <a:p>
             <a:fld id="{2D851175-439F-4176-B87B-D52E5408CB3F}" type="datetimeFigureOut">
               <a:rPr lang="et-EE" smtClean="0"/>
-              <a:t>25.10.2015</a:t>
+              <a:t>27.04.2016</a:t>
             </a:fld>
             <a:endParaRPr lang="et-EE"/>
           </a:p>
@@ -638,7 +638,7 @@
           <a:p>
             <a:fld id="{2D851175-439F-4176-B87B-D52E5408CB3F}" type="datetimeFigureOut">
               <a:rPr lang="et-EE" smtClean="0"/>
-              <a:t>25.10.2015</a:t>
+              <a:t>27.04.2016</a:t>
             </a:fld>
             <a:endParaRPr lang="et-EE"/>
           </a:p>
@@ -808,7 +808,7 @@
           <a:p>
             <a:fld id="{2D851175-439F-4176-B87B-D52E5408CB3F}" type="datetimeFigureOut">
               <a:rPr lang="et-EE" smtClean="0"/>
-              <a:t>25.10.2015</a:t>
+              <a:t>27.04.2016</a:t>
             </a:fld>
             <a:endParaRPr lang="et-EE"/>
           </a:p>
@@ -1054,7 +1054,7 @@
           <a:p>
             <a:fld id="{2D851175-439F-4176-B87B-D52E5408CB3F}" type="datetimeFigureOut">
               <a:rPr lang="et-EE" smtClean="0"/>
-              <a:t>25.10.2015</a:t>
+              <a:t>27.04.2016</a:t>
             </a:fld>
             <a:endParaRPr lang="et-EE"/>
           </a:p>
@@ -1342,7 +1342,7 @@
           <a:p>
             <a:fld id="{2D851175-439F-4176-B87B-D52E5408CB3F}" type="datetimeFigureOut">
               <a:rPr lang="et-EE" smtClean="0"/>
-              <a:t>25.10.2015</a:t>
+              <a:t>27.04.2016</a:t>
             </a:fld>
             <a:endParaRPr lang="et-EE"/>
           </a:p>
@@ -1764,7 +1764,7 @@
           <a:p>
             <a:fld id="{2D851175-439F-4176-B87B-D52E5408CB3F}" type="datetimeFigureOut">
               <a:rPr lang="et-EE" smtClean="0"/>
-              <a:t>25.10.2015</a:t>
+              <a:t>27.04.2016</a:t>
             </a:fld>
             <a:endParaRPr lang="et-EE"/>
           </a:p>
@@ -1882,7 +1882,7 @@
           <a:p>
             <a:fld id="{2D851175-439F-4176-B87B-D52E5408CB3F}" type="datetimeFigureOut">
               <a:rPr lang="et-EE" smtClean="0"/>
-              <a:t>25.10.2015</a:t>
+              <a:t>27.04.2016</a:t>
             </a:fld>
             <a:endParaRPr lang="et-EE"/>
           </a:p>
@@ -1977,7 +1977,7 @@
           <a:p>
             <a:fld id="{2D851175-439F-4176-B87B-D52E5408CB3F}" type="datetimeFigureOut">
               <a:rPr lang="et-EE" smtClean="0"/>
-              <a:t>25.10.2015</a:t>
+              <a:t>27.04.2016</a:t>
             </a:fld>
             <a:endParaRPr lang="et-EE"/>
           </a:p>
@@ -2254,7 +2254,7 @@
           <a:p>
             <a:fld id="{2D851175-439F-4176-B87B-D52E5408CB3F}" type="datetimeFigureOut">
               <a:rPr lang="et-EE" smtClean="0"/>
-              <a:t>25.10.2015</a:t>
+              <a:t>27.04.2016</a:t>
             </a:fld>
             <a:endParaRPr lang="et-EE"/>
           </a:p>
@@ -2507,7 +2507,7 @@
           <a:p>
             <a:fld id="{2D851175-439F-4176-B87B-D52E5408CB3F}" type="datetimeFigureOut">
               <a:rPr lang="et-EE" smtClean="0"/>
-              <a:t>25.10.2015</a:t>
+              <a:t>27.04.2016</a:t>
             </a:fld>
             <a:endParaRPr lang="et-EE"/>
           </a:p>
@@ -2720,7 +2720,7 @@
           <a:p>
             <a:fld id="{2D851175-439F-4176-B87B-D52E5408CB3F}" type="datetimeFigureOut">
               <a:rPr lang="et-EE" smtClean="0"/>
-              <a:t>25.10.2015</a:t>
+              <a:t>27.04.2016</a:t>
             </a:fld>
             <a:endParaRPr lang="et-EE"/>
           </a:p>
@@ -3103,8 +3103,8 @@
         </p:nvSpPr>
         <p:spPr>
           <a:xfrm>
-            <a:off x="2732198" y="3552850"/>
-            <a:ext cx="1368152" cy="792088"/>
+            <a:off x="2855036" y="3526366"/>
+            <a:ext cx="1368152" cy="928573"/>
           </a:xfrm>
           <a:prstGeom prst="rect">
             <a:avLst/>
@@ -3250,8 +3250,8 @@
         </p:nvCxnSpPr>
         <p:spPr>
           <a:xfrm>
-            <a:off x="4100350" y="3801803"/>
-            <a:ext cx="813544" cy="0"/>
+            <a:off x="4223188" y="3801803"/>
+            <a:ext cx="690706" cy="0"/>
           </a:xfrm>
           <a:prstGeom prst="line">
             <a:avLst/>
@@ -3371,8 +3371,8 @@
         </p:nvCxnSpPr>
         <p:spPr>
           <a:xfrm>
-            <a:off x="3923928" y="4337186"/>
-            <a:ext cx="4877" cy="477018"/>
+            <a:off x="3923928" y="4445976"/>
+            <a:ext cx="0" cy="240643"/>
           </a:xfrm>
           <a:prstGeom prst="line">
             <a:avLst/>
@@ -3406,7 +3406,7 @@
         </p:nvSpPr>
         <p:spPr>
           <a:xfrm>
-            <a:off x="4704542" y="4532731"/>
+            <a:off x="6479974" y="4816806"/>
             <a:ext cx="418704" cy="307777"/>
           </a:xfrm>
           <a:prstGeom prst="rect">
@@ -3444,8 +3444,8 @@
         </p:nvCxnSpPr>
         <p:spPr>
           <a:xfrm>
-            <a:off x="4100350" y="4027128"/>
-            <a:ext cx="813544" cy="0"/>
+            <a:off x="2118862" y="4686619"/>
+            <a:ext cx="4296634" cy="0"/>
           </a:xfrm>
           <a:prstGeom prst="line">
             <a:avLst/>
@@ -3471,44 +3471,6 @@
           </a:fontRef>
         </p:style>
       </p:cxnSp>
-      <p:sp>
-        <p:nvSpPr>
-          <p:cNvPr id="18" name="TextBox 17"/>
-          <p:cNvSpPr txBox="1"/>
-          <p:nvPr/>
-        </p:nvSpPr>
-        <p:spPr>
-          <a:xfrm>
-            <a:off x="4186888" y="4037161"/>
-            <a:ext cx="418704" cy="307777"/>
-          </a:xfrm>
-          <a:prstGeom prst="rect">
-            <a:avLst/>
-          </a:prstGeom>
-          <a:noFill/>
-        </p:spPr>
-        <p:txBody>
-          <a:bodyPr wrap="none" rtlCol="0">
-            <a:spAutoFit/>
-          </a:bodyPr>
-          <a:lstStyle/>
-          <a:p>
-            <a:r>
-              <a:rPr lang="et-EE" sz="1400" dirty="0" smtClean="0">
-                <a:solidFill>
-                  <a:srgbClr val="FF0000"/>
-                </a:solidFill>
-              </a:rPr>
-              <a:t>5 V</a:t>
-            </a:r>
-            <a:endParaRPr lang="et-EE" sz="1400" dirty="0">
-              <a:solidFill>
-                <a:srgbClr val="FF0000"/>
-              </a:solidFill>
-            </a:endParaRPr>
-          </a:p>
-        </p:txBody>
-      </p:sp>
       <p:sp>
         <p:nvSpPr>
           <p:cNvPr id="19" name="Rectangle 18"/>
@@ -3629,8 +3591,8 @@
         </p:nvCxnSpPr>
         <p:spPr>
           <a:xfrm>
-            <a:off x="1043608" y="4725144"/>
-            <a:ext cx="2372666" cy="0"/>
+            <a:off x="1032352" y="4941168"/>
+            <a:ext cx="2506760" cy="0"/>
           </a:xfrm>
           <a:prstGeom prst="line">
             <a:avLst/>
@@ -3695,51 +3657,14 @@
         <p:nvCxnSpPr>
           <p:cNvPr id="31" name="Straight Connector 30"/>
           <p:cNvCxnSpPr>
-            <a:endCxn id="19" idx="0"/>
-          </p:cNvCxnSpPr>
-          <p:nvPr/>
-        </p:nvCxnSpPr>
-        <p:spPr>
-          <a:xfrm>
-            <a:off x="3416274" y="4534830"/>
-            <a:ext cx="0" cy="622362"/>
-          </a:xfrm>
-          <a:prstGeom prst="line">
-            <a:avLst/>
-          </a:prstGeom>
-          <a:ln>
-            <a:solidFill>
-              <a:srgbClr val="00B050"/>
-            </a:solidFill>
-          </a:ln>
-        </p:spPr>
-        <p:style>
-          <a:lnRef idx="1">
-            <a:schemeClr val="accent1"/>
-          </a:lnRef>
-          <a:fillRef idx="0">
-            <a:schemeClr val="accent1"/>
-          </a:fillRef>
-          <a:effectRef idx="0">
-            <a:schemeClr val="accent1"/>
-          </a:effectRef>
-          <a:fontRef idx="minor">
-            <a:schemeClr val="tx1"/>
-          </a:fontRef>
-        </p:style>
-      </p:cxnSp>
-      <p:cxnSp>
-        <p:nvCxnSpPr>
-          <p:cNvPr id="33" name="Straight Connector 32"/>
-          <p:cNvCxnSpPr>
             <a:stCxn id="4" idx="2"/>
           </p:cNvCxnSpPr>
           <p:nvPr/>
         </p:nvCxnSpPr>
         <p:spPr>
           <a:xfrm>
-            <a:off x="3416274" y="4344938"/>
-            <a:ext cx="0" cy="380206"/>
+            <a:off x="3539112" y="4454939"/>
+            <a:ext cx="0" cy="669644"/>
           </a:xfrm>
           <a:prstGeom prst="line">
             <a:avLst/>
@@ -3943,41 +3868,6 @@
       </p:sp>
       <p:cxnSp>
         <p:nvCxnSpPr>
-          <p:cNvPr id="45" name="Straight Connector 44"/>
-          <p:cNvCxnSpPr/>
-          <p:nvPr/>
-        </p:nvCxnSpPr>
-        <p:spPr>
-          <a:xfrm>
-            <a:off x="3928805" y="4814204"/>
-            <a:ext cx="2486691" cy="0"/>
-          </a:xfrm>
-          <a:prstGeom prst="line">
-            <a:avLst/>
-          </a:prstGeom>
-          <a:ln>
-            <a:solidFill>
-              <a:srgbClr val="FF0000"/>
-            </a:solidFill>
-          </a:ln>
-        </p:spPr>
-        <p:style>
-          <a:lnRef idx="1">
-            <a:schemeClr val="accent1"/>
-          </a:lnRef>
-          <a:fillRef idx="0">
-            <a:schemeClr val="accent1"/>
-          </a:fillRef>
-          <a:effectRef idx="0">
-            <a:schemeClr val="accent1"/>
-          </a:effectRef>
-          <a:fontRef idx="minor">
-            <a:schemeClr val="tx1"/>
-          </a:fontRef>
-        </p:style>
-      </p:cxnSp>
-      <p:cxnSp>
-        <p:nvCxnSpPr>
           <p:cNvPr id="46" name="Straight Connector 45"/>
           <p:cNvCxnSpPr/>
           <p:nvPr/>
@@ -4054,11 +3944,15 @@
                   <a:schemeClr val="tx1"/>
                 </a:solidFill>
               </a:rPr>
-              <a:t>Pan/Tilt</a:t>
+              <a:t>VisionBoard</a:t>
             </a:r>
             <a:r>
               <a:rPr lang="et-EE" dirty="0" smtClean="0"/>
-              <a:t>r B</a:t>
+              <a:t>r </a:t>
+            </a:r>
+            <a:r>
+              <a:rPr lang="et-EE" dirty="0" smtClean="0"/>
+              <a:t>B</a:t>
             </a:r>
             <a:r>
               <a:rPr lang="et-EE" dirty="0" smtClean="0">
@@ -4087,7 +3981,7 @@
           </a:prstGeom>
           <a:ln>
             <a:solidFill>
-              <a:schemeClr val="tx1"/>
+              <a:schemeClr val="accent1"/>
             </a:solidFill>
           </a:ln>
         </p:spPr>
@@ -4106,36 +4000,6 @@
           </a:fontRef>
         </p:style>
       </p:cxnSp>
-      <p:sp>
-        <p:nvSpPr>
-          <p:cNvPr id="55" name="TextBox 54"/>
-          <p:cNvSpPr txBox="1"/>
-          <p:nvPr/>
-        </p:nvSpPr>
-        <p:spPr>
-          <a:xfrm>
-            <a:off x="3967633" y="2400970"/>
-            <a:ext cx="668901" cy="307777"/>
-          </a:xfrm>
-          <a:prstGeom prst="rect">
-            <a:avLst/>
-          </a:prstGeom>
-          <a:noFill/>
-        </p:spPr>
-        <p:txBody>
-          <a:bodyPr wrap="none" rtlCol="0">
-            <a:spAutoFit/>
-          </a:bodyPr>
-          <a:lstStyle/>
-          <a:p>
-            <a:r>
-              <a:rPr lang="et-EE" sz="1400" dirty="0" smtClean="0"/>
-              <a:t>USART</a:t>
-            </a:r>
-            <a:endParaRPr lang="et-EE" sz="1400" dirty="0"/>
-          </a:p>
-        </p:txBody>
-      </p:sp>
       <p:cxnSp>
         <p:nvCxnSpPr>
           <p:cNvPr id="59" name="Straight Connector 58"/>
@@ -4359,7 +4223,7 @@
         </p:nvSpPr>
         <p:spPr>
           <a:xfrm>
-            <a:off x="7596336" y="3897556"/>
+            <a:off x="7596336" y="4801583"/>
             <a:ext cx="510076" cy="307777"/>
           </a:xfrm>
           <a:prstGeom prst="rect">
@@ -4545,7 +4409,7 @@
           </a:prstGeom>
           <a:ln>
             <a:solidFill>
-              <a:schemeClr val="tx1"/>
+              <a:schemeClr val="accent1"/>
             </a:solidFill>
           </a:ln>
         </p:spPr>
@@ -4638,7 +4502,7 @@
         <p:spPr>
           <a:xfrm>
             <a:off x="2118862" y="3800765"/>
-            <a:ext cx="613336" cy="1038"/>
+            <a:ext cx="736174" cy="1038"/>
           </a:xfrm>
           <a:prstGeom prst="line">
             <a:avLst/>
@@ -4673,7 +4537,7 @@
         <p:spPr>
           <a:xfrm>
             <a:off x="1368419" y="3682876"/>
-            <a:ext cx="750442" cy="513243"/>
+            <a:ext cx="750442" cy="463177"/>
           </a:xfrm>
           <a:prstGeom prst="rect">
             <a:avLst/>
@@ -4786,14 +4650,13 @@
           <p:cNvPr id="114" name="Straight Connector 113"/>
           <p:cNvCxnSpPr>
             <a:stCxn id="110" idx="3"/>
-            <a:endCxn id="4" idx="1"/>
           </p:cNvCxnSpPr>
           <p:nvPr/>
         </p:nvCxnSpPr>
         <p:spPr>
           <a:xfrm>
-            <a:off x="2118861" y="3939498"/>
-            <a:ext cx="613337" cy="9396"/>
+            <a:off x="2118861" y="3914465"/>
+            <a:ext cx="663881" cy="0"/>
           </a:xfrm>
           <a:prstGeom prst="line">
             <a:avLst/>
@@ -4819,44 +4682,6 @@
           </a:fontRef>
         </p:style>
       </p:cxnSp>
-      <p:sp>
-        <p:nvSpPr>
-          <p:cNvPr id="116" name="TextBox 115"/>
-          <p:cNvSpPr txBox="1"/>
-          <p:nvPr/>
-        </p:nvSpPr>
-        <p:spPr>
-          <a:xfrm>
-            <a:off x="2149803" y="3992165"/>
-            <a:ext cx="418704" cy="307777"/>
-          </a:xfrm>
-          <a:prstGeom prst="rect">
-            <a:avLst/>
-          </a:prstGeom>
-          <a:noFill/>
-        </p:spPr>
-        <p:txBody>
-          <a:bodyPr wrap="none" rtlCol="0">
-            <a:spAutoFit/>
-          </a:bodyPr>
-          <a:lstStyle/>
-          <a:p>
-            <a:r>
-              <a:rPr lang="et-EE" sz="1400" dirty="0" smtClean="0">
-                <a:solidFill>
-                  <a:srgbClr val="FF0000"/>
-                </a:solidFill>
-              </a:rPr>
-              <a:t>5 V</a:t>
-            </a:r>
-            <a:endParaRPr lang="et-EE" sz="1400" dirty="0">
-              <a:solidFill>
-                <a:srgbClr val="FF0000"/>
-              </a:solidFill>
-            </a:endParaRPr>
-          </a:p>
-        </p:txBody>
-      </p:sp>
       <p:sp>
         <p:nvSpPr>
           <p:cNvPr id="121" name="Rectangle 120"/>
@@ -5008,8 +4833,8 @@
         </p:nvSpPr>
         <p:spPr>
           <a:xfrm>
-            <a:off x="8168479" y="2400970"/>
-            <a:ext cx="502061" cy="307777"/>
+            <a:off x="8088453" y="2491568"/>
+            <a:ext cx="378630" cy="307777"/>
           </a:xfrm>
           <a:prstGeom prst="rect">
             <a:avLst/>
@@ -5028,7 +4853,7 @@
                   <a:srgbClr val="FF0000"/>
                 </a:solidFill>
               </a:rPr>
-              <a:t>5V ?</a:t>
+              <a:t>5V</a:t>
             </a:r>
             <a:endParaRPr lang="et-EE" sz="1400" dirty="0">
               <a:solidFill>
@@ -5038,6 +4863,306 @@
           </a:p>
         </p:txBody>
       </p:sp>
+      <p:sp>
+        <p:nvSpPr>
+          <p:cNvPr id="52" name="Rectangle 51"/>
+          <p:cNvSpPr/>
+          <p:nvPr/>
+        </p:nvSpPr>
+        <p:spPr>
+          <a:xfrm>
+            <a:off x="1368420" y="4280520"/>
+            <a:ext cx="750442" cy="463177"/>
+          </a:xfrm>
+          <a:prstGeom prst="rect">
+            <a:avLst/>
+          </a:prstGeom>
+          <a:noFill/>
+        </p:spPr>
+        <p:style>
+          <a:lnRef idx="2">
+            <a:schemeClr val="accent1">
+              <a:shade val="50000"/>
+            </a:schemeClr>
+          </a:lnRef>
+          <a:fillRef idx="1">
+            <a:schemeClr val="accent1"/>
+          </a:fillRef>
+          <a:effectRef idx="0">
+            <a:schemeClr val="accent1"/>
+          </a:effectRef>
+          <a:fontRef idx="minor">
+            <a:schemeClr val="lt1"/>
+          </a:fontRef>
+        </p:style>
+        <p:txBody>
+          <a:bodyPr rtlCol="0" anchor="ctr"/>
+          <a:lstStyle/>
+          <a:p>
+            <a:pPr algn="ctr"/>
+            <a:r>
+              <a:rPr lang="et-EE" dirty="0" smtClean="0">
+                <a:solidFill>
+                  <a:schemeClr val="tx1"/>
+                </a:solidFill>
+              </a:rPr>
+              <a:t>IMU</a:t>
+            </a:r>
+            <a:r>
+              <a:rPr lang="et-EE" dirty="0" smtClean="0"/>
+              <a:t>s </a:t>
+            </a:r>
+            <a:r>
+              <a:rPr lang="et-EE" dirty="0" smtClean="0"/>
+              <a:t>Board</a:t>
+            </a:r>
+            <a:endParaRPr lang="et-EE" dirty="0"/>
+          </a:p>
+        </p:txBody>
+      </p:sp>
+      <p:cxnSp>
+        <p:nvCxnSpPr>
+          <p:cNvPr id="61" name="Straight Connector 60"/>
+          <p:cNvCxnSpPr/>
+          <p:nvPr/>
+        </p:nvCxnSpPr>
+        <p:spPr>
+          <a:xfrm>
+            <a:off x="5167130" y="4205333"/>
+            <a:ext cx="5020" cy="481286"/>
+          </a:xfrm>
+          <a:prstGeom prst="line">
+            <a:avLst/>
+          </a:prstGeom>
+          <a:ln>
+            <a:solidFill>
+              <a:srgbClr val="FF0000"/>
+            </a:solidFill>
+          </a:ln>
+        </p:spPr>
+        <p:style>
+          <a:lnRef idx="1">
+            <a:schemeClr val="accent1"/>
+          </a:lnRef>
+          <a:fillRef idx="0">
+            <a:schemeClr val="accent1"/>
+          </a:fillRef>
+          <a:effectRef idx="0">
+            <a:schemeClr val="accent1"/>
+          </a:effectRef>
+          <a:fontRef idx="minor">
+            <a:schemeClr val="tx1"/>
+          </a:fontRef>
+        </p:style>
+      </p:cxnSp>
+      <p:cxnSp>
+        <p:nvCxnSpPr>
+          <p:cNvPr id="63" name="Straight Connector 62"/>
+          <p:cNvCxnSpPr/>
+          <p:nvPr/>
+        </p:nvCxnSpPr>
+        <p:spPr>
+          <a:xfrm>
+            <a:off x="2782742" y="3897086"/>
+            <a:ext cx="0" cy="789533"/>
+          </a:xfrm>
+          <a:prstGeom prst="line">
+            <a:avLst/>
+          </a:prstGeom>
+          <a:ln>
+            <a:solidFill>
+              <a:srgbClr val="FF0000"/>
+            </a:solidFill>
+          </a:ln>
+        </p:spPr>
+        <p:style>
+          <a:lnRef idx="1">
+            <a:schemeClr val="accent1"/>
+          </a:lnRef>
+          <a:fillRef idx="0">
+            <a:schemeClr val="accent1"/>
+          </a:fillRef>
+          <a:effectRef idx="0">
+            <a:schemeClr val="accent1"/>
+          </a:effectRef>
+          <a:fontRef idx="minor">
+            <a:schemeClr val="tx1"/>
+          </a:fontRef>
+        </p:style>
+      </p:cxnSp>
+      <p:cxnSp>
+        <p:nvCxnSpPr>
+          <p:cNvPr id="77" name="Straight Connector 76"/>
+          <p:cNvCxnSpPr/>
+          <p:nvPr/>
+        </p:nvCxnSpPr>
+        <p:spPr>
+          <a:xfrm>
+            <a:off x="2118862" y="4314038"/>
+            <a:ext cx="736174" cy="0"/>
+          </a:xfrm>
+          <a:prstGeom prst="line">
+            <a:avLst/>
+          </a:prstGeom>
+          <a:ln>
+            <a:solidFill>
+              <a:schemeClr val="tx1"/>
+            </a:solidFill>
+          </a:ln>
+        </p:spPr>
+        <p:style>
+          <a:lnRef idx="1">
+            <a:schemeClr val="accent1"/>
+          </a:lnRef>
+          <a:fillRef idx="0">
+            <a:schemeClr val="accent1"/>
+          </a:fillRef>
+          <a:effectRef idx="0">
+            <a:schemeClr val="accent1"/>
+          </a:effectRef>
+          <a:fontRef idx="minor">
+            <a:schemeClr val="tx1"/>
+          </a:fontRef>
+        </p:style>
+      </p:cxnSp>
+      <p:sp>
+        <p:nvSpPr>
+          <p:cNvPr id="80" name="TextBox 79"/>
+          <p:cNvSpPr txBox="1"/>
+          <p:nvPr/>
+        </p:nvSpPr>
+        <p:spPr>
+          <a:xfrm>
+            <a:off x="2118861" y="4335278"/>
+            <a:ext cx="668901" cy="307777"/>
+          </a:xfrm>
+          <a:prstGeom prst="rect">
+            <a:avLst/>
+          </a:prstGeom>
+          <a:noFill/>
+        </p:spPr>
+        <p:txBody>
+          <a:bodyPr wrap="none" rtlCol="0">
+            <a:spAutoFit/>
+          </a:bodyPr>
+          <a:lstStyle/>
+          <a:p>
+            <a:r>
+              <a:rPr lang="et-EE" sz="1400" dirty="0" smtClean="0"/>
+              <a:t>USART</a:t>
+            </a:r>
+            <a:endParaRPr lang="et-EE" sz="1400" dirty="0"/>
+          </a:p>
+        </p:txBody>
+      </p:sp>
+      <p:sp>
+        <p:nvSpPr>
+          <p:cNvPr id="87" name="TextBox 86"/>
+          <p:cNvSpPr txBox="1"/>
+          <p:nvPr/>
+        </p:nvSpPr>
+        <p:spPr>
+          <a:xfrm>
+            <a:off x="4267179" y="2408817"/>
+            <a:ext cx="479618" cy="307777"/>
+          </a:xfrm>
+          <a:prstGeom prst="rect">
+            <a:avLst/>
+          </a:prstGeom>
+          <a:noFill/>
+        </p:spPr>
+        <p:txBody>
+          <a:bodyPr wrap="none" rtlCol="0">
+            <a:spAutoFit/>
+          </a:bodyPr>
+          <a:lstStyle/>
+          <a:p>
+            <a:r>
+              <a:rPr lang="et-EE" sz="1400" dirty="0" smtClean="0">
+                <a:solidFill>
+                  <a:srgbClr val="0070C0"/>
+                </a:solidFill>
+              </a:rPr>
+              <a:t>USB</a:t>
+            </a:r>
+            <a:endParaRPr lang="et-EE" sz="1400" dirty="0">
+              <a:solidFill>
+                <a:srgbClr val="0070C0"/>
+              </a:solidFill>
+            </a:endParaRPr>
+          </a:p>
+        </p:txBody>
+      </p:sp>
+      <p:cxnSp>
+        <p:nvCxnSpPr>
+          <p:cNvPr id="88" name="Straight Connector 87"/>
+          <p:cNvCxnSpPr/>
+          <p:nvPr/>
+        </p:nvCxnSpPr>
+        <p:spPr>
+          <a:xfrm>
+            <a:off x="6415897" y="3284984"/>
+            <a:ext cx="1612487" cy="0"/>
+          </a:xfrm>
+          <a:prstGeom prst="line">
+            <a:avLst/>
+          </a:prstGeom>
+          <a:ln>
+            <a:solidFill>
+              <a:srgbClr val="FF0000"/>
+            </a:solidFill>
+          </a:ln>
+        </p:spPr>
+        <p:style>
+          <a:lnRef idx="1">
+            <a:schemeClr val="accent1"/>
+          </a:lnRef>
+          <a:fillRef idx="0">
+            <a:schemeClr val="accent1"/>
+          </a:fillRef>
+          <a:effectRef idx="0">
+            <a:schemeClr val="accent1"/>
+          </a:effectRef>
+          <a:fontRef idx="minor">
+            <a:schemeClr val="tx1"/>
+          </a:fontRef>
+        </p:style>
+      </p:cxnSp>
+      <p:cxnSp>
+        <p:nvCxnSpPr>
+          <p:cNvPr id="90" name="Straight Connector 89"/>
+          <p:cNvCxnSpPr/>
+          <p:nvPr/>
+        </p:nvCxnSpPr>
+        <p:spPr>
+          <a:xfrm>
+            <a:off x="8028384" y="2320341"/>
+            <a:ext cx="9600" cy="958009"/>
+          </a:xfrm>
+          <a:prstGeom prst="line">
+            <a:avLst/>
+          </a:prstGeom>
+          <a:ln>
+            <a:solidFill>
+              <a:srgbClr val="FF0000"/>
+            </a:solidFill>
+          </a:ln>
+        </p:spPr>
+        <p:style>
+          <a:lnRef idx="1">
+            <a:schemeClr val="accent1"/>
+          </a:lnRef>
+          <a:fillRef idx="0">
+            <a:schemeClr val="accent1"/>
+          </a:fillRef>
+          <a:effectRef idx="0">
+            <a:schemeClr val="accent1"/>
+          </a:effectRef>
+          <a:fontRef idx="minor">
+            <a:schemeClr val="tx1"/>
+          </a:fontRef>
+        </p:style>
+      </p:cxnSp>
     </p:spTree>
     <p:extLst>
       <p:ext uri="{BB962C8B-B14F-4D97-AF65-F5344CB8AC3E}">

</xml_diff>